<commit_message>
Se cambió la fecha
</commit_message>
<xml_diff>
--- a/imagenes/Make_img.pptx
+++ b/imagenes/Make_img.pptx
@@ -263,7 +263,7 @@
           <a:p>
             <a:fld id="{29678B5A-351E-4098-8F04-5692B504D35C}" type="datetimeFigureOut">
               <a:rPr lang="en-AU" smtClean="0"/>
-              <a:t>13/04/2023</a:t>
+              <a:t>20/04/2023</a:t>
             </a:fld>
             <a:endParaRPr lang="en-AU"/>
           </a:p>
@@ -433,7 +433,7 @@
           <a:p>
             <a:fld id="{29678B5A-351E-4098-8F04-5692B504D35C}" type="datetimeFigureOut">
               <a:rPr lang="en-AU" smtClean="0"/>
-              <a:t>13/04/2023</a:t>
+              <a:t>20/04/2023</a:t>
             </a:fld>
             <a:endParaRPr lang="en-AU"/>
           </a:p>
@@ -613,7 +613,7 @@
           <a:p>
             <a:fld id="{29678B5A-351E-4098-8F04-5692B504D35C}" type="datetimeFigureOut">
               <a:rPr lang="en-AU" smtClean="0"/>
-              <a:t>13/04/2023</a:t>
+              <a:t>20/04/2023</a:t>
             </a:fld>
             <a:endParaRPr lang="en-AU"/>
           </a:p>
@@ -783,7 +783,7 @@
           <a:p>
             <a:fld id="{29678B5A-351E-4098-8F04-5692B504D35C}" type="datetimeFigureOut">
               <a:rPr lang="en-AU" smtClean="0"/>
-              <a:t>13/04/2023</a:t>
+              <a:t>20/04/2023</a:t>
             </a:fld>
             <a:endParaRPr lang="en-AU"/>
           </a:p>
@@ -1029,7 +1029,7 @@
           <a:p>
             <a:fld id="{29678B5A-351E-4098-8F04-5692B504D35C}" type="datetimeFigureOut">
               <a:rPr lang="en-AU" smtClean="0"/>
-              <a:t>13/04/2023</a:t>
+              <a:t>20/04/2023</a:t>
             </a:fld>
             <a:endParaRPr lang="en-AU"/>
           </a:p>
@@ -1261,7 +1261,7 @@
           <a:p>
             <a:fld id="{29678B5A-351E-4098-8F04-5692B504D35C}" type="datetimeFigureOut">
               <a:rPr lang="en-AU" smtClean="0"/>
-              <a:t>13/04/2023</a:t>
+              <a:t>20/04/2023</a:t>
             </a:fld>
             <a:endParaRPr lang="en-AU"/>
           </a:p>
@@ -1628,7 +1628,7 @@
           <a:p>
             <a:fld id="{29678B5A-351E-4098-8F04-5692B504D35C}" type="datetimeFigureOut">
               <a:rPr lang="en-AU" smtClean="0"/>
-              <a:t>13/04/2023</a:t>
+              <a:t>20/04/2023</a:t>
             </a:fld>
             <a:endParaRPr lang="en-AU"/>
           </a:p>
@@ -1746,7 +1746,7 @@
           <a:p>
             <a:fld id="{29678B5A-351E-4098-8F04-5692B504D35C}" type="datetimeFigureOut">
               <a:rPr lang="en-AU" smtClean="0"/>
-              <a:t>13/04/2023</a:t>
+              <a:t>20/04/2023</a:t>
             </a:fld>
             <a:endParaRPr lang="en-AU"/>
           </a:p>
@@ -1841,7 +1841,7 @@
           <a:p>
             <a:fld id="{29678B5A-351E-4098-8F04-5692B504D35C}" type="datetimeFigureOut">
               <a:rPr lang="en-AU" smtClean="0"/>
-              <a:t>13/04/2023</a:t>
+              <a:t>20/04/2023</a:t>
             </a:fld>
             <a:endParaRPr lang="en-AU"/>
           </a:p>
@@ -2118,7 +2118,7 @@
           <a:p>
             <a:fld id="{29678B5A-351E-4098-8F04-5692B504D35C}" type="datetimeFigureOut">
               <a:rPr lang="en-AU" smtClean="0"/>
-              <a:t>13/04/2023</a:t>
+              <a:t>20/04/2023</a:t>
             </a:fld>
             <a:endParaRPr lang="en-AU"/>
           </a:p>
@@ -2371,7 +2371,7 @@
           <a:p>
             <a:fld id="{29678B5A-351E-4098-8F04-5692B504D35C}" type="datetimeFigureOut">
               <a:rPr lang="en-AU" smtClean="0"/>
-              <a:t>13/04/2023</a:t>
+              <a:t>20/04/2023</a:t>
             </a:fld>
             <a:endParaRPr lang="en-AU"/>
           </a:p>
@@ -2587,7 +2587,7 @@
           <a:p>
             <a:fld id="{29678B5A-351E-4098-8F04-5692B504D35C}" type="datetimeFigureOut">
               <a:rPr lang="en-AU" smtClean="0"/>
-              <a:t>13/04/2023</a:t>
+              <a:t>20/04/2023</a:t>
             </a:fld>
             <a:endParaRPr lang="en-AU"/>
           </a:p>
@@ -3617,8 +3617,8 @@
         </p:nvSpPr>
         <p:spPr>
           <a:xfrm>
-            <a:off x="2537714" y="11155"/>
-            <a:ext cx="7189789" cy="1569660"/>
+            <a:off x="1800334" y="11155"/>
+            <a:ext cx="8664551" cy="1569660"/>
           </a:xfrm>
           <a:prstGeom prst="rect">
             <a:avLst/>
@@ -3663,7 +3663,7 @@
                 <a:latin typeface="Courier New" panose="02070309020205020404" pitchFamily="49" charset="0"/>
                 <a:cs typeface="Courier New" panose="02070309020205020404" pitchFamily="49" charset="0"/>
               </a:rPr>
-              <a:t>Diciembre 1 de 2023</a:t>
+              <a:t>24 de noviembre de 2023</a:t>
             </a:r>
             <a:endParaRPr lang="en-AU" sz="4800" dirty="0">
               <a:solidFill>

</xml_diff>

<commit_message>
se cambió el nombre
</commit_message>
<xml_diff>
--- a/imagenes/Make_img.pptx
+++ b/imagenes/Make_img.pptx
@@ -263,7 +263,7 @@
           <a:p>
             <a:fld id="{29678B5A-351E-4098-8F04-5692B504D35C}" type="datetimeFigureOut">
               <a:rPr lang="en-AU" smtClean="0"/>
-              <a:t>20/04/2023</a:t>
+              <a:t>15/05/2023</a:t>
             </a:fld>
             <a:endParaRPr lang="en-AU"/>
           </a:p>
@@ -433,7 +433,7 @@
           <a:p>
             <a:fld id="{29678B5A-351E-4098-8F04-5692B504D35C}" type="datetimeFigureOut">
               <a:rPr lang="en-AU" smtClean="0"/>
-              <a:t>20/04/2023</a:t>
+              <a:t>15/05/2023</a:t>
             </a:fld>
             <a:endParaRPr lang="en-AU"/>
           </a:p>
@@ -613,7 +613,7 @@
           <a:p>
             <a:fld id="{29678B5A-351E-4098-8F04-5692B504D35C}" type="datetimeFigureOut">
               <a:rPr lang="en-AU" smtClean="0"/>
-              <a:t>20/04/2023</a:t>
+              <a:t>15/05/2023</a:t>
             </a:fld>
             <a:endParaRPr lang="en-AU"/>
           </a:p>
@@ -783,7 +783,7 @@
           <a:p>
             <a:fld id="{29678B5A-351E-4098-8F04-5692B504D35C}" type="datetimeFigureOut">
               <a:rPr lang="en-AU" smtClean="0"/>
-              <a:t>20/04/2023</a:t>
+              <a:t>15/05/2023</a:t>
             </a:fld>
             <a:endParaRPr lang="en-AU"/>
           </a:p>
@@ -1029,7 +1029,7 @@
           <a:p>
             <a:fld id="{29678B5A-351E-4098-8F04-5692B504D35C}" type="datetimeFigureOut">
               <a:rPr lang="en-AU" smtClean="0"/>
-              <a:t>20/04/2023</a:t>
+              <a:t>15/05/2023</a:t>
             </a:fld>
             <a:endParaRPr lang="en-AU"/>
           </a:p>
@@ -1261,7 +1261,7 @@
           <a:p>
             <a:fld id="{29678B5A-351E-4098-8F04-5692B504D35C}" type="datetimeFigureOut">
               <a:rPr lang="en-AU" smtClean="0"/>
-              <a:t>20/04/2023</a:t>
+              <a:t>15/05/2023</a:t>
             </a:fld>
             <a:endParaRPr lang="en-AU"/>
           </a:p>
@@ -1628,7 +1628,7 @@
           <a:p>
             <a:fld id="{29678B5A-351E-4098-8F04-5692B504D35C}" type="datetimeFigureOut">
               <a:rPr lang="en-AU" smtClean="0"/>
-              <a:t>20/04/2023</a:t>
+              <a:t>15/05/2023</a:t>
             </a:fld>
             <a:endParaRPr lang="en-AU"/>
           </a:p>
@@ -1746,7 +1746,7 @@
           <a:p>
             <a:fld id="{29678B5A-351E-4098-8F04-5692B504D35C}" type="datetimeFigureOut">
               <a:rPr lang="en-AU" smtClean="0"/>
-              <a:t>20/04/2023</a:t>
+              <a:t>15/05/2023</a:t>
             </a:fld>
             <a:endParaRPr lang="en-AU"/>
           </a:p>
@@ -1841,7 +1841,7 @@
           <a:p>
             <a:fld id="{29678B5A-351E-4098-8F04-5692B504D35C}" type="datetimeFigureOut">
               <a:rPr lang="en-AU" smtClean="0"/>
-              <a:t>20/04/2023</a:t>
+              <a:t>15/05/2023</a:t>
             </a:fld>
             <a:endParaRPr lang="en-AU"/>
           </a:p>
@@ -2118,7 +2118,7 @@
           <a:p>
             <a:fld id="{29678B5A-351E-4098-8F04-5692B504D35C}" type="datetimeFigureOut">
               <a:rPr lang="en-AU" smtClean="0"/>
-              <a:t>20/04/2023</a:t>
+              <a:t>15/05/2023</a:t>
             </a:fld>
             <a:endParaRPr lang="en-AU"/>
           </a:p>
@@ -2371,7 +2371,7 @@
           <a:p>
             <a:fld id="{29678B5A-351E-4098-8F04-5692B504D35C}" type="datetimeFigureOut">
               <a:rPr lang="en-AU" smtClean="0"/>
-              <a:t>20/04/2023</a:t>
+              <a:t>15/05/2023</a:t>
             </a:fld>
             <a:endParaRPr lang="en-AU"/>
           </a:p>
@@ -2587,7 +2587,7 @@
           <a:p>
             <a:fld id="{29678B5A-351E-4098-8F04-5692B504D35C}" type="datetimeFigureOut">
               <a:rPr lang="en-AU" smtClean="0"/>
-              <a:t>20/04/2023</a:t>
+              <a:t>15/05/2023</a:t>
             </a:fld>
             <a:endParaRPr lang="en-AU"/>
           </a:p>
@@ -3046,24 +3046,14 @@
           <a:p>
             <a:pPr algn="ctr"/>
             <a:r>
-              <a:rPr lang="es-CO" sz="4800" dirty="0" err="1">
+              <a:rPr lang="es-CO" sz="4800" dirty="0">
                 <a:solidFill>
                   <a:schemeClr val="bg1"/>
                 </a:solidFill>
                 <a:latin typeface="Courier New" panose="02070309020205020404" pitchFamily="49" charset="0"/>
                 <a:cs typeface="Courier New" panose="02070309020205020404" pitchFamily="49" charset="0"/>
               </a:rPr>
-              <a:t>Rday</a:t>
-            </a:r>
-            <a:r>
-              <a:rPr lang="es-CO" sz="4800" dirty="0">
-                <a:solidFill>
-                  <a:schemeClr val="bg1"/>
-                </a:solidFill>
-                <a:latin typeface="Courier New" panose="02070309020205020404" pitchFamily="49" charset="0"/>
-                <a:cs typeface="Courier New" panose="02070309020205020404" pitchFamily="49" charset="0"/>
-              </a:rPr>
-              <a:t> Medellín</a:t>
+              <a:t>R Day Medellín</a:t>
             </a:r>
           </a:p>
           <a:p>
@@ -3633,24 +3623,14 @@
           <a:p>
             <a:pPr algn="ctr"/>
             <a:r>
-              <a:rPr lang="es-CO" sz="4800" dirty="0" err="1">
+              <a:rPr lang="es-CO" sz="4800" dirty="0">
                 <a:solidFill>
                   <a:schemeClr val="bg1"/>
                 </a:solidFill>
                 <a:latin typeface="Courier New" panose="02070309020205020404" pitchFamily="49" charset="0"/>
                 <a:cs typeface="Courier New" panose="02070309020205020404" pitchFamily="49" charset="0"/>
               </a:rPr>
-              <a:t>Rday</a:t>
-            </a:r>
-            <a:r>
-              <a:rPr lang="es-CO" sz="4800" dirty="0">
-                <a:solidFill>
-                  <a:schemeClr val="bg1"/>
-                </a:solidFill>
-                <a:latin typeface="Courier New" panose="02070309020205020404" pitchFamily="49" charset="0"/>
-                <a:cs typeface="Courier New" panose="02070309020205020404" pitchFamily="49" charset="0"/>
-              </a:rPr>
-              <a:t> Medellín</a:t>
+              <a:t>R Day - Medellín</a:t>
             </a:r>
           </a:p>
           <a:p>

</xml_diff>